<commit_message>
Added presentation.xml modification code
</commit_message>
<xml_diff>
--- a/Testing1.pptx
+++ b/Testing1.pptx
@@ -1,3 +1,116 @@
+
+<file path=ppt/presentation.xml><?xml version="1.0" encoding="utf-8"?>
+<p:presentation xmlns:a="http://schemas.openxmlformats.org/drawingml/2006/main" xmlns:r="http://schemas.openxmlformats.org/officeDocument/2006/relationships" xmlns:p="http://schemas.openxmlformats.org/presentationml/2006/main" saveSubsetFonts="1">
+  <p:sldMasterIdLst>
+    <p:sldMasterId id="2147483648" r:id="rId1"/>
+  </p:sldMasterIdLst>
+  <p:sldIdLst>
+    <p:sldId id="256" r:id="rId2"/>
+  </p:sldIdLst>
+  <p:sldSz cx="12192000" cy="6858000"/>
+  <p:notesSz cx="6858000" cy="9144000"/>
+  <p:defaultTextStyle>
+    <a:defPPr>
+      <a:defRPr lang="en-US"/>
+    </a:defPPr>
+    <a:lvl1pPr marL="0" algn="l" defTabSz="914400" rtl="0" eaLnBrk="1" latinLnBrk="0" hangingPunct="1">
+      <a:defRPr sz="1800" kern="1200">
+        <a:solidFill>
+          <a:schemeClr val="tx1"/>
+        </a:solidFill>
+        <a:latin typeface="+mn-lt"/>
+        <a:ea typeface="+mn-ea"/>
+        <a:cs typeface="+mn-cs"/>
+      </a:defRPr>
+    </a:lvl1pPr>
+    <a:lvl2pPr marL="457200" algn="l" defTabSz="914400" rtl="0" eaLnBrk="1" latinLnBrk="0" hangingPunct="1">
+      <a:defRPr sz="1800" kern="1200">
+        <a:solidFill>
+          <a:schemeClr val="tx1"/>
+        </a:solidFill>
+        <a:latin typeface="+mn-lt"/>
+        <a:ea typeface="+mn-ea"/>
+        <a:cs typeface="+mn-cs"/>
+      </a:defRPr>
+    </a:lvl2pPr>
+    <a:lvl3pPr marL="914400" algn="l" defTabSz="914400" rtl="0" eaLnBrk="1" latinLnBrk="0" hangingPunct="1">
+      <a:defRPr sz="1800" kern="1200">
+        <a:solidFill>
+          <a:schemeClr val="tx1"/>
+        </a:solidFill>
+        <a:latin typeface="+mn-lt"/>
+        <a:ea typeface="+mn-ea"/>
+        <a:cs typeface="+mn-cs"/>
+      </a:defRPr>
+    </a:lvl3pPr>
+    <a:lvl4pPr marL="1371600" algn="l" defTabSz="914400" rtl="0" eaLnBrk="1" latinLnBrk="0" hangingPunct="1">
+      <a:defRPr sz="1800" kern="1200">
+        <a:solidFill>
+          <a:schemeClr val="tx1"/>
+        </a:solidFill>
+        <a:latin typeface="+mn-lt"/>
+        <a:ea typeface="+mn-ea"/>
+        <a:cs typeface="+mn-cs"/>
+      </a:defRPr>
+    </a:lvl4pPr>
+    <a:lvl5pPr marL="1828800" algn="l" defTabSz="914400" rtl="0" eaLnBrk="1" latinLnBrk="0" hangingPunct="1">
+      <a:defRPr sz="1800" kern="1200">
+        <a:solidFill>
+          <a:schemeClr val="tx1"/>
+        </a:solidFill>
+        <a:latin typeface="+mn-lt"/>
+        <a:ea typeface="+mn-ea"/>
+        <a:cs typeface="+mn-cs"/>
+      </a:defRPr>
+    </a:lvl5pPr>
+    <a:lvl6pPr marL="2286000" algn="l" defTabSz="914400" rtl="0" eaLnBrk="1" latinLnBrk="0" hangingPunct="1">
+      <a:defRPr sz="1800" kern="1200">
+        <a:solidFill>
+          <a:schemeClr val="tx1"/>
+        </a:solidFill>
+        <a:latin typeface="+mn-lt"/>
+        <a:ea typeface="+mn-ea"/>
+        <a:cs typeface="+mn-cs"/>
+      </a:defRPr>
+    </a:lvl6pPr>
+    <a:lvl7pPr marL="2743200" algn="l" defTabSz="914400" rtl="0" eaLnBrk="1" latinLnBrk="0" hangingPunct="1">
+      <a:defRPr sz="1800" kern="1200">
+        <a:solidFill>
+          <a:schemeClr val="tx1"/>
+        </a:solidFill>
+        <a:latin typeface="+mn-lt"/>
+        <a:ea typeface="+mn-ea"/>
+        <a:cs typeface="+mn-cs"/>
+      </a:defRPr>
+    </a:lvl7pPr>
+    <a:lvl8pPr marL="3200400" algn="l" defTabSz="914400" rtl="0" eaLnBrk="1" latinLnBrk="0" hangingPunct="1">
+      <a:defRPr sz="1800" kern="1200">
+        <a:solidFill>
+          <a:schemeClr val="tx1"/>
+        </a:solidFill>
+        <a:latin typeface="+mn-lt"/>
+        <a:ea typeface="+mn-ea"/>
+        <a:cs typeface="+mn-cs"/>
+      </a:defRPr>
+    </a:lvl8pPr>
+    <a:lvl9pPr marL="3657600" algn="l" defTabSz="914400" rtl="0" eaLnBrk="1" latinLnBrk="0" hangingPunct="1">
+      <a:defRPr sz="1800" kern="1200">
+        <a:solidFill>
+          <a:schemeClr val="tx1"/>
+        </a:solidFill>
+        <a:latin typeface="+mn-lt"/>
+        <a:ea typeface="+mn-ea"/>
+        <a:cs typeface="+mn-cs"/>
+      </a:defRPr>
+    </a:lvl9pPr>
+  </p:defaultTextStyle>
+  <p:extLst>
+    <p:ext uri="{EFAFB233-063F-42B5-8137-9DF3F51BA10A}">
+      <p15:sldGuideLst xmlns:p15="http://schemas.microsoft.com/office/powerpoint/2012/main"/>
+    </p:ext>
+  </p:extLst>
+</p:presentation>
+</file>
 
 <file path=ppt/slideLayouts/slideLayout1.xml><?xml version="1.0" encoding="utf-8"?>
 <p:sldLayout xmlns:a="http://schemas.openxmlformats.org/drawingml/2006/main" xmlns:r="http://schemas.openxmlformats.org/officeDocument/2006/relationships" xmlns:p="http://schemas.openxmlformats.org/presentationml/2006/main" type="title" preserve="1">

</xml_diff>